<commit_message>
background almost ready. will go over again
</commit_message>
<xml_diff>
--- a/working-thesis/figures/gene-model-fig-msc.pptx
+++ b/working-thesis/figures/gene-model-fig-msc.pptx
@@ -104,6 +104,11 @@
       </a:defRPr>
     </a:lvl9pPr>
   </p:defaultTextStyle>
+  <p:extLst>
+    <p:ext uri="{EFAFB233-063F-42B5-8137-9DF3F51BA10A}">
+      <p15:sldGuideLst xmlns:p15="http://schemas.microsoft.com/office/powerpoint/2012/main"/>
+    </p:ext>
+  </p:extLst>
 </p:presentation>
 </file>
 
@@ -331,7 +336,7 @@
           <a:p>
             <a:fld id="{3E608EAD-868E-4C56-9B18-1689D581C06A}" type="datetimeFigureOut">
               <a:rPr lang="en-US" smtClean="0"/>
-              <a:t>7/14/2025</a:t>
+              <a:t>7/16/2025</a:t>
             </a:fld>
             <a:endParaRPr lang="en-US"/>
           </a:p>
@@ -529,7 +534,7 @@
           <a:p>
             <a:fld id="{3E608EAD-868E-4C56-9B18-1689D581C06A}" type="datetimeFigureOut">
               <a:rPr lang="en-US" smtClean="0"/>
-              <a:t>7/14/2025</a:t>
+              <a:t>7/16/2025</a:t>
             </a:fld>
             <a:endParaRPr lang="en-US"/>
           </a:p>
@@ -737,7 +742,7 @@
           <a:p>
             <a:fld id="{3E608EAD-868E-4C56-9B18-1689D581C06A}" type="datetimeFigureOut">
               <a:rPr lang="en-US" smtClean="0"/>
-              <a:t>7/14/2025</a:t>
+              <a:t>7/16/2025</a:t>
             </a:fld>
             <a:endParaRPr lang="en-US"/>
           </a:p>
@@ -935,7 +940,7 @@
           <a:p>
             <a:fld id="{3E608EAD-868E-4C56-9B18-1689D581C06A}" type="datetimeFigureOut">
               <a:rPr lang="en-US" smtClean="0"/>
-              <a:t>7/14/2025</a:t>
+              <a:t>7/16/2025</a:t>
             </a:fld>
             <a:endParaRPr lang="en-US"/>
           </a:p>
@@ -1210,7 +1215,7 @@
           <a:p>
             <a:fld id="{3E608EAD-868E-4C56-9B18-1689D581C06A}" type="datetimeFigureOut">
               <a:rPr lang="en-US" smtClean="0"/>
-              <a:t>7/14/2025</a:t>
+              <a:t>7/16/2025</a:t>
             </a:fld>
             <a:endParaRPr lang="en-US"/>
           </a:p>
@@ -1475,7 +1480,7 @@
           <a:p>
             <a:fld id="{3E608EAD-868E-4C56-9B18-1689D581C06A}" type="datetimeFigureOut">
               <a:rPr lang="en-US" smtClean="0"/>
-              <a:t>7/14/2025</a:t>
+              <a:t>7/16/2025</a:t>
             </a:fld>
             <a:endParaRPr lang="en-US"/>
           </a:p>
@@ -1887,7 +1892,7 @@
           <a:p>
             <a:fld id="{3E608EAD-868E-4C56-9B18-1689D581C06A}" type="datetimeFigureOut">
               <a:rPr lang="en-US" smtClean="0"/>
-              <a:t>7/14/2025</a:t>
+              <a:t>7/16/2025</a:t>
             </a:fld>
             <a:endParaRPr lang="en-US"/>
           </a:p>
@@ -2028,7 +2033,7 @@
           <a:p>
             <a:fld id="{3E608EAD-868E-4C56-9B18-1689D581C06A}" type="datetimeFigureOut">
               <a:rPr lang="en-US" smtClean="0"/>
-              <a:t>7/14/2025</a:t>
+              <a:t>7/16/2025</a:t>
             </a:fld>
             <a:endParaRPr lang="en-US"/>
           </a:p>
@@ -2141,7 +2146,7 @@
           <a:p>
             <a:fld id="{3E608EAD-868E-4C56-9B18-1689D581C06A}" type="datetimeFigureOut">
               <a:rPr lang="en-US" smtClean="0"/>
-              <a:t>7/14/2025</a:t>
+              <a:t>7/16/2025</a:t>
             </a:fld>
             <a:endParaRPr lang="en-US"/>
           </a:p>
@@ -2452,7 +2457,7 @@
           <a:p>
             <a:fld id="{3E608EAD-868E-4C56-9B18-1689D581C06A}" type="datetimeFigureOut">
               <a:rPr lang="en-US" smtClean="0"/>
-              <a:t>7/14/2025</a:t>
+              <a:t>7/16/2025</a:t>
             </a:fld>
             <a:endParaRPr lang="en-US"/>
           </a:p>
@@ -2740,7 +2745,7 @@
           <a:p>
             <a:fld id="{3E608EAD-868E-4C56-9B18-1689D581C06A}" type="datetimeFigureOut">
               <a:rPr lang="en-US" smtClean="0"/>
-              <a:t>7/14/2025</a:t>
+              <a:t>7/16/2025</a:t>
             </a:fld>
             <a:endParaRPr lang="en-US"/>
           </a:p>
@@ -2981,7 +2986,7 @@
           <a:p>
             <a:fld id="{3E608EAD-868E-4C56-9B18-1689D581C06A}" type="datetimeFigureOut">
               <a:rPr lang="en-US" smtClean="0"/>
-              <a:t>7/14/2025</a:t>
+              <a:t>7/16/2025</a:t>
             </a:fld>
             <a:endParaRPr lang="en-US"/>
           </a:p>
@@ -3547,7 +3552,7 @@
           <a:p>
             <a:r>
               <a:rPr lang="en-US" dirty="0"/>
-              <a:t>5’ UTR</a:t>
+              <a:t>5′ UTR</a:t>
             </a:r>
           </a:p>
         </p:txBody>
@@ -4440,7 +4445,7 @@
           <a:p>
             <a:r>
               <a:rPr lang="en-US" dirty="0"/>
-              <a:t>3’ UTR</a:t>
+              <a:t>3′ UTR</a:t>
             </a:r>
           </a:p>
         </p:txBody>
@@ -4826,7 +4831,7 @@
         <p:spPr>
           <a:xfrm>
             <a:off x="1072081" y="3264759"/>
-            <a:ext cx="1550540" cy="369332"/>
+            <a:ext cx="370478" cy="369332"/>
           </a:xfrm>
           <a:prstGeom prst="rect">
             <a:avLst/>
@@ -4841,46 +4846,105 @@
           <a:p>
             <a:r>
               <a:rPr lang="en-US" dirty="0"/>
-              <a:t>5’</a:t>
-            </a:r>
-          </a:p>
-        </p:txBody>
-      </p:sp>
-      <p:sp>
-        <p:nvSpPr>
-          <p:cNvPr id="50" name="TextBox 49">
-            <a:extLst>
-              <a:ext uri="{FF2B5EF4-FFF2-40B4-BE49-F238E27FC236}">
-                <a16:creationId xmlns:a16="http://schemas.microsoft.com/office/drawing/2014/main" id="{25F85822-E6B1-E058-7F79-EE5AFB3E741D}"/>
-              </a:ext>
-            </a:extLst>
-          </p:cNvPr>
-          <p:cNvSpPr txBox="1"/>
-          <p:nvPr/>
-        </p:nvSpPr>
-        <p:spPr>
-          <a:xfrm>
-            <a:off x="9275804" y="3264759"/>
-            <a:ext cx="1550540" cy="369332"/>
-          </a:xfrm>
-          <a:prstGeom prst="rect">
-            <a:avLst/>
-          </a:prstGeom>
-          <a:noFill/>
-        </p:spPr>
-        <p:txBody>
-          <a:bodyPr wrap="square" rtlCol="0">
-            <a:spAutoFit/>
-          </a:bodyPr>
-          <a:lstStyle/>
-          <a:p>
-            <a:r>
-              <a:rPr lang="en-US" dirty="0"/>
-              <a:t>3’</a:t>
-            </a:r>
-          </a:p>
-        </p:txBody>
-      </p:sp>
+              <a:t>5′</a:t>
+            </a:r>
+          </a:p>
+        </p:txBody>
+      </p:sp>
+      <mc:AlternateContent xmlns:mc="http://schemas.openxmlformats.org/markup-compatibility/2006">
+        <mc:Choice xmlns:a14="http://schemas.microsoft.com/office/drawing/2010/main" Requires="a14">
+          <p:sp>
+            <p:nvSpPr>
+              <p:cNvPr id="50" name="TextBox 49">
+                <a:extLst>
+                  <a:ext uri="{FF2B5EF4-FFF2-40B4-BE49-F238E27FC236}">
+                    <a16:creationId xmlns:a16="http://schemas.microsoft.com/office/drawing/2014/main" id="{25F85822-E6B1-E058-7F79-EE5AFB3E741D}"/>
+                  </a:ext>
+                </a:extLst>
+              </p:cNvPr>
+              <p:cNvSpPr txBox="1"/>
+              <p:nvPr/>
+            </p:nvSpPr>
+            <p:spPr>
+              <a:xfrm>
+                <a:off x="9275804" y="3264759"/>
+                <a:ext cx="364920" cy="369332"/>
+              </a:xfrm>
+              <a:prstGeom prst="rect">
+                <a:avLst/>
+              </a:prstGeom>
+              <a:noFill/>
+            </p:spPr>
+            <p:txBody>
+              <a:bodyPr wrap="square" rtlCol="0">
+                <a:spAutoFit/>
+              </a:bodyPr>
+              <a:lstStyle/>
+              <a:p>
+                <a:r>
+                  <a:rPr lang="en-US" dirty="0"/>
+                  <a:t>3</a:t>
+                </a:r>
+                <a14:m>
+                  <m:oMath xmlns:m="http://schemas.openxmlformats.org/officeDocument/2006/math">
+                    <m:r>
+                      <a:rPr lang="en-US" i="1" smtClean="0">
+                        <a:latin typeface="Cambria Math" panose="02040503050406030204" pitchFamily="18" charset="0"/>
+                      </a:rPr>
+                      <m:t>′</m:t>
+                    </m:r>
+                  </m:oMath>
+                </a14:m>
+                <a:endParaRPr lang="en-US" dirty="0"/>
+              </a:p>
+            </p:txBody>
+          </p:sp>
+        </mc:Choice>
+        <mc:Fallback>
+          <p:sp>
+            <p:nvSpPr>
+              <p:cNvPr id="50" name="TextBox 49">
+                <a:extLst>
+                  <a:ext uri="{FF2B5EF4-FFF2-40B4-BE49-F238E27FC236}">
+                    <a16:creationId xmlns:a16="http://schemas.microsoft.com/office/drawing/2014/main" id="{25F85822-E6B1-E058-7F79-EE5AFB3E741D}"/>
+                  </a:ext>
+                </a:extLst>
+              </p:cNvPr>
+              <p:cNvSpPr txBox="1">
+                <a:spLocks noRot="1" noChangeAspect="1" noMove="1" noResize="1" noEditPoints="1" noAdjustHandles="1" noChangeArrowheads="1" noChangeShapeType="1" noTextEdit="1"/>
+              </p:cNvSpPr>
+              <p:nvPr/>
+            </p:nvSpPr>
+            <p:spPr>
+              <a:xfrm>
+                <a:off x="9275804" y="3264759"/>
+                <a:ext cx="364920" cy="369332"/>
+              </a:xfrm>
+              <a:prstGeom prst="rect">
+                <a:avLst/>
+              </a:prstGeom>
+              <a:blipFill>
+                <a:blip r:embed="rId2"/>
+                <a:stretch>
+                  <a:fillRect l="-15254" t="-10000" b="-26667"/>
+                </a:stretch>
+              </a:blipFill>
+            </p:spPr>
+            <p:txBody>
+              <a:bodyPr/>
+              <a:lstStyle/>
+              <a:p>
+                <a:r>
+                  <a:rPr lang="en-CA">
+                    <a:noFill/>
+                  </a:rPr>
+                  <a:t> </a:t>
+                </a:r>
+              </a:p>
+            </p:txBody>
+          </p:sp>
+        </mc:Fallback>
+      </mc:AlternateContent>
       <p:sp>
         <p:nvSpPr>
           <p:cNvPr id="51" name="TextBox 50">

</xml_diff>

<commit_message>
addressed Tony's comments. Dave's next
</commit_message>
<xml_diff>
--- a/working-thesis/figures/gene-model-fig-msc.pptx
+++ b/working-thesis/figures/gene-model-fig-msc.pptx
@@ -336,7 +336,7 @@
           <a:p>
             <a:fld id="{3E608EAD-868E-4C56-9B18-1689D581C06A}" type="datetimeFigureOut">
               <a:rPr lang="en-US" smtClean="0"/>
-              <a:t>7/16/2025</a:t>
+              <a:t>9/13/2025</a:t>
             </a:fld>
             <a:endParaRPr lang="en-US"/>
           </a:p>
@@ -534,7 +534,7 @@
           <a:p>
             <a:fld id="{3E608EAD-868E-4C56-9B18-1689D581C06A}" type="datetimeFigureOut">
               <a:rPr lang="en-US" smtClean="0"/>
-              <a:t>7/16/2025</a:t>
+              <a:t>9/13/2025</a:t>
             </a:fld>
             <a:endParaRPr lang="en-US"/>
           </a:p>
@@ -742,7 +742,7 @@
           <a:p>
             <a:fld id="{3E608EAD-868E-4C56-9B18-1689D581C06A}" type="datetimeFigureOut">
               <a:rPr lang="en-US" smtClean="0"/>
-              <a:t>7/16/2025</a:t>
+              <a:t>9/13/2025</a:t>
             </a:fld>
             <a:endParaRPr lang="en-US"/>
           </a:p>
@@ -940,7 +940,7 @@
           <a:p>
             <a:fld id="{3E608EAD-868E-4C56-9B18-1689D581C06A}" type="datetimeFigureOut">
               <a:rPr lang="en-US" smtClean="0"/>
-              <a:t>7/16/2025</a:t>
+              <a:t>9/13/2025</a:t>
             </a:fld>
             <a:endParaRPr lang="en-US"/>
           </a:p>
@@ -1215,7 +1215,7 @@
           <a:p>
             <a:fld id="{3E608EAD-868E-4C56-9B18-1689D581C06A}" type="datetimeFigureOut">
               <a:rPr lang="en-US" smtClean="0"/>
-              <a:t>7/16/2025</a:t>
+              <a:t>9/13/2025</a:t>
             </a:fld>
             <a:endParaRPr lang="en-US"/>
           </a:p>
@@ -1480,7 +1480,7 @@
           <a:p>
             <a:fld id="{3E608EAD-868E-4C56-9B18-1689D581C06A}" type="datetimeFigureOut">
               <a:rPr lang="en-US" smtClean="0"/>
-              <a:t>7/16/2025</a:t>
+              <a:t>9/13/2025</a:t>
             </a:fld>
             <a:endParaRPr lang="en-US"/>
           </a:p>
@@ -1892,7 +1892,7 @@
           <a:p>
             <a:fld id="{3E608EAD-868E-4C56-9B18-1689D581C06A}" type="datetimeFigureOut">
               <a:rPr lang="en-US" smtClean="0"/>
-              <a:t>7/16/2025</a:t>
+              <a:t>9/13/2025</a:t>
             </a:fld>
             <a:endParaRPr lang="en-US"/>
           </a:p>
@@ -2033,7 +2033,7 @@
           <a:p>
             <a:fld id="{3E608EAD-868E-4C56-9B18-1689D581C06A}" type="datetimeFigureOut">
               <a:rPr lang="en-US" smtClean="0"/>
-              <a:t>7/16/2025</a:t>
+              <a:t>9/13/2025</a:t>
             </a:fld>
             <a:endParaRPr lang="en-US"/>
           </a:p>
@@ -2146,7 +2146,7 @@
           <a:p>
             <a:fld id="{3E608EAD-868E-4C56-9B18-1689D581C06A}" type="datetimeFigureOut">
               <a:rPr lang="en-US" smtClean="0"/>
-              <a:t>7/16/2025</a:t>
+              <a:t>9/13/2025</a:t>
             </a:fld>
             <a:endParaRPr lang="en-US"/>
           </a:p>
@@ -2457,7 +2457,7 @@
           <a:p>
             <a:fld id="{3E608EAD-868E-4C56-9B18-1689D581C06A}" type="datetimeFigureOut">
               <a:rPr lang="en-US" smtClean="0"/>
-              <a:t>7/16/2025</a:t>
+              <a:t>9/13/2025</a:t>
             </a:fld>
             <a:endParaRPr lang="en-US"/>
           </a:p>
@@ -2745,7 +2745,7 @@
           <a:p>
             <a:fld id="{3E608EAD-868E-4C56-9B18-1689D581C06A}" type="datetimeFigureOut">
               <a:rPr lang="en-US" smtClean="0"/>
-              <a:t>7/16/2025</a:t>
+              <a:t>9/13/2025</a:t>
             </a:fld>
             <a:endParaRPr lang="en-US"/>
           </a:p>
@@ -2986,7 +2986,7 @@
           <a:p>
             <a:fld id="{3E608EAD-868E-4C56-9B18-1689D581C06A}" type="datetimeFigureOut">
               <a:rPr lang="en-US" smtClean="0"/>
-              <a:t>7/16/2025</a:t>
+              <a:t>9/13/2025</a:t>
             </a:fld>
             <a:endParaRPr lang="en-US"/>
           </a:p>
@@ -4784,21 +4784,23 @@
           </p:cNvPr>
           <p:cNvCxnSpPr>
             <a:cxnSpLocks/>
-            <a:stCxn id="10" idx="1"/>
-            <a:endCxn id="23" idx="3"/>
           </p:cNvCxnSpPr>
           <p:nvPr/>
         </p:nvCxnSpPr>
         <p:spPr>
           <a:xfrm flipV="1">
-            <a:off x="3802880" y="3423963"/>
+            <a:off x="3802879" y="3421476"/>
             <a:ext cx="3912371" cy="520"/>
           </a:xfrm>
           <a:prstGeom prst="straightConnector1">
             <a:avLst/>
           </a:prstGeom>
-          <a:ln>
-            <a:tailEnd type="triangle"/>
+          <a:ln w="47625">
+            <a:solidFill>
+              <a:schemeClr val="tx1"/>
+            </a:solidFill>
+            <a:prstDash val="solid"/>
+            <a:tailEnd type="stealth" w="lg" len="lg"/>
           </a:ln>
         </p:spPr>
         <p:style>
@@ -4851,8 +4853,8 @@
           </a:p>
         </p:txBody>
       </p:sp>
-      <mc:AlternateContent xmlns:mc="http://schemas.openxmlformats.org/markup-compatibility/2006">
-        <mc:Choice xmlns:a14="http://schemas.microsoft.com/office/drawing/2010/main" Requires="a14">
+      <mc:AlternateContent xmlns:mc="http://schemas.openxmlformats.org/markup-compatibility/2006" xmlns:a14="http://schemas.microsoft.com/office/drawing/2010/main">
+        <mc:Choice Requires="a14">
           <p:sp>
             <p:nvSpPr>
               <p:cNvPr id="50" name="TextBox 49">
@@ -4900,7 +4902,7 @@
             </p:txBody>
           </p:sp>
         </mc:Choice>
-        <mc:Fallback>
+        <mc:Fallback xmlns="">
           <p:sp>
             <p:nvSpPr>
               <p:cNvPr id="50" name="TextBox 49">

</xml_diff>